<commit_message>
hack the cookie for booker
</commit_message>
<xml_diff>
--- a/dialog.pptx
+++ b/dialog.pptx
@@ -3661,10 +3661,10 @@
       </p:sp>
       <p:sp>
         <p:nvSpPr>
-          <p:cNvPr id="11" name="Rectangle 10">
-            <a:extLst>
-              <a:ext uri="{FF2B5EF4-FFF2-40B4-BE49-F238E27FC236}">
-                <a16:creationId xmlns:a16="http://schemas.microsoft.com/office/drawing/2014/main" id="{810CD9D1-CB88-498D-8D40-03F7D6C4AA5A}"/>
+          <p:cNvPr id="12" name="Rectangle 11">
+            <a:extLst>
+              <a:ext uri="{FF2B5EF4-FFF2-40B4-BE49-F238E27FC236}">
+                <a16:creationId xmlns:a16="http://schemas.microsoft.com/office/drawing/2014/main" id="{855756DC-ECB8-422A-ABD7-6D00E42C55BA}"/>
               </a:ext>
             </a:extLst>
           </p:cNvPr>
@@ -3673,57 +3673,7 @@
         </p:nvSpPr>
         <p:spPr>
           <a:xfrm>
-            <a:off x="4604004" y="3981993"/>
-            <a:ext cx="3255264" cy="611124"/>
-          </a:xfrm>
-          <a:prstGeom prst="rect">
-            <a:avLst/>
-          </a:prstGeom>
-        </p:spPr>
-        <p:style>
-          <a:lnRef idx="2">
-            <a:schemeClr val="accent3">
-              <a:shade val="50000"/>
-            </a:schemeClr>
-          </a:lnRef>
-          <a:fillRef idx="1">
-            <a:schemeClr val="accent3"/>
-          </a:fillRef>
-          <a:effectRef idx="0">
-            <a:schemeClr val="accent3"/>
-          </a:effectRef>
-          <a:fontRef idx="minor">
-            <a:schemeClr val="lt1"/>
-          </a:fontRef>
-        </p:style>
-        <p:txBody>
-          <a:bodyPr rtlCol="0" anchor="ctr"/>
-          <a:lstStyle/>
-          <a:p>
-            <a:pPr algn="ctr"/>
-            <a:r>
-              <a:rPr lang="de-DE" dirty="0"/>
-              <a:t>I will book a table for you for 4 people in 8:00 PM</a:t>
-            </a:r>
-            <a:endParaRPr lang="LID4096" dirty="0"/>
-          </a:p>
-        </p:txBody>
-      </p:sp>
-      <p:sp>
-        <p:nvSpPr>
-          <p:cNvPr id="12" name="Rectangle 11">
-            <a:extLst>
-              <a:ext uri="{FF2B5EF4-FFF2-40B4-BE49-F238E27FC236}">
-                <a16:creationId xmlns:a16="http://schemas.microsoft.com/office/drawing/2014/main" id="{855756DC-ECB8-422A-ABD7-6D00E42C55BA}"/>
-              </a:ext>
-            </a:extLst>
-          </p:cNvPr>
-          <p:cNvSpPr/>
-          <p:nvPr/>
-        </p:nvSpPr>
-        <p:spPr>
-          <a:xfrm>
-            <a:off x="5422392" y="6122936"/>
+            <a:off x="5385816" y="4960287"/>
             <a:ext cx="1618488" cy="345186"/>
           </a:xfrm>
           <a:prstGeom prst="rect">
@@ -3773,7 +3723,7 @@
         </p:nvSpPr>
         <p:spPr>
           <a:xfrm>
-            <a:off x="4604004" y="5305473"/>
+            <a:off x="4567428" y="4142824"/>
             <a:ext cx="3255264" cy="611124"/>
           </a:xfrm>
           <a:prstGeom prst="rect">
@@ -4004,56 +3954,6 @@
             <a:r>
               <a:rPr lang="de-DE" dirty="0"/>
               <a:t>How many people</a:t>
-            </a:r>
-            <a:endParaRPr lang="LID4096" dirty="0"/>
-          </a:p>
-        </p:txBody>
-      </p:sp>
-      <p:sp>
-        <p:nvSpPr>
-          <p:cNvPr id="18" name="Rectangle 17">
-            <a:extLst>
-              <a:ext uri="{FF2B5EF4-FFF2-40B4-BE49-F238E27FC236}">
-                <a16:creationId xmlns:a16="http://schemas.microsoft.com/office/drawing/2014/main" id="{CC4DAA23-9FA2-4B34-AA19-90BC68B8BDAC}"/>
-              </a:ext>
-            </a:extLst>
-          </p:cNvPr>
-          <p:cNvSpPr/>
-          <p:nvPr/>
-        </p:nvSpPr>
-        <p:spPr>
-          <a:xfrm>
-            <a:off x="5422392" y="4742087"/>
-            <a:ext cx="1618488" cy="345186"/>
-          </a:xfrm>
-          <a:prstGeom prst="rect">
-            <a:avLst/>
-          </a:prstGeom>
-        </p:spPr>
-        <p:style>
-          <a:lnRef idx="2">
-            <a:schemeClr val="accent2">
-              <a:shade val="50000"/>
-            </a:schemeClr>
-          </a:lnRef>
-          <a:fillRef idx="1">
-            <a:schemeClr val="accent2"/>
-          </a:fillRef>
-          <a:effectRef idx="0">
-            <a:schemeClr val="accent2"/>
-          </a:effectRef>
-          <a:fontRef idx="minor">
-            <a:schemeClr val="lt1"/>
-          </a:fontRef>
-        </p:style>
-        <p:txBody>
-          <a:bodyPr rtlCol="0" anchor="ctr"/>
-          <a:lstStyle/>
-          <a:p>
-            <a:pPr algn="ctr"/>
-            <a:r>
-              <a:rPr lang="de-DE" dirty="0"/>
-              <a:t>ýes</a:t>
             </a:r>
             <a:endParaRPr lang="LID4096" dirty="0"/>
           </a:p>

</xml_diff>